<commit_message>
Changes to WFE slide formatting.
</commit_message>
<xml_diff>
--- a/University of Washington Class/Module 0 - Introduction.pptx
+++ b/University of Washington Class/Module 0 - Introduction.pptx
@@ -456,7 +456,7 @@
               <a:pPr>
                 <a:defRPr/>
               </a:pPr>
-              <a:t>10/24/2011</a:t>
+              <a:t>11/14/2011</a:t>
             </a:fld>
             <a:endParaRPr lang="en-US"/>
           </a:p>
@@ -677,7 +677,7 @@
               <a:pPr>
                 <a:defRPr/>
               </a:pPr>
-              <a:t>10/24/2011</a:t>
+              <a:t>11/14/2011</a:t>
             </a:fld>
             <a:endParaRPr lang="en-US"/>
           </a:p>
@@ -1002,7 +1002,7 @@
               <a:pPr>
                 <a:defRPr/>
               </a:pPr>
-              <a:t>10/24/2011</a:t>
+              <a:t>11/14/2011</a:t>
             </a:fld>
             <a:endParaRPr lang="en-US"/>
           </a:p>
@@ -1453,7 +1453,7 @@
               <a:pPr>
                 <a:defRPr/>
               </a:pPr>
-              <a:t>10/24/2011</a:t>
+              <a:t>11/14/2011</a:t>
             </a:fld>
             <a:endParaRPr lang="en-US"/>
           </a:p>
@@ -1598,7 +1598,7 @@
               <a:pPr>
                 <a:defRPr/>
               </a:pPr>
-              <a:t>10/24/2011</a:t>
+              <a:t>11/14/2011</a:t>
             </a:fld>
             <a:endParaRPr lang="en-US"/>
           </a:p>
@@ -1720,7 +1720,7 @@
               <a:pPr>
                 <a:defRPr/>
               </a:pPr>
-              <a:t>10/24/2011</a:t>
+              <a:t>11/14/2011</a:t>
             </a:fld>
             <a:endParaRPr lang="en-US"/>
           </a:p>
@@ -2013,7 +2013,7 @@
               <a:pPr>
                 <a:defRPr/>
               </a:pPr>
-              <a:t>10/24/2011</a:t>
+              <a:t>11/14/2011</a:t>
             </a:fld>
             <a:endParaRPr lang="en-US"/>
           </a:p>
@@ -2710,8 +2710,17 @@
           <a:p>
             <a:r>
               <a:rPr lang="en-US" dirty="0"/>
-              <a:t>Module 8: Demand response</a:t>
-            </a:r>
+              <a:t>Module 8: </a:t>
+            </a:r>
+            <a:r>
+              <a:rPr lang="en-US"/>
+              <a:t>Demand </a:t>
+            </a:r>
+            <a:r>
+              <a:rPr lang="en-US" smtClean="0"/>
+              <a:t>response</a:t>
+            </a:r>
+            <a:endParaRPr lang="en-US" dirty="0"/>
           </a:p>
           <a:p>
             <a:r>

</xml_diff>